<commit_message>
Updated UG/DG as well as PPP.
changed some messages expected from download commands
</commit_message>
<xml_diff>
--- a/docs/diagrams/ModelComponentClassDiagram.pptx
+++ b/docs/diagrams/ModelComponentClassDiagram.pptx
@@ -5,10 +5,11 @@
     <p:sldMasterId id="2147483648" r:id="rId1"/>
   </p:sldMasterIdLst>
   <p:notesMasterIdLst>
-    <p:notesMasterId r:id="rId3"/>
+    <p:notesMasterId r:id="rId4"/>
   </p:notesMasterIdLst>
   <p:sldIdLst>
     <p:sldId id="263" r:id="rId2"/>
+    <p:sldId id="264" r:id="rId3"/>
   </p:sldIdLst>
   <p:sldSz cx="9144000" cy="6858000" type="screen4x3"/>
   <p:notesSz cx="6858000" cy="9144000"/>
@@ -208,7 +209,7 @@
           <a:p>
             <a:fld id="{F5CC4B3F-88C1-4FFA-B1B6-F41C21DC6924}" type="datetimeFigureOut">
               <a:rPr lang="en-US" smtClean="0"/>
-              <a:t>10/23/18</a:t>
+              <a:t>11/10/2018</a:t>
             </a:fld>
             <a:endParaRPr lang="en-US"/>
           </a:p>
@@ -654,7 +655,7 @@
           <a:p>
             <a:fld id="{78C97017-6FC3-485B-9764-EAC9E56C1D49}" type="datetimeFigureOut">
               <a:rPr lang="en-US" smtClean="0"/>
-              <a:t>10/23/18</a:t>
+              <a:t>11/10/2018</a:t>
             </a:fld>
             <a:endParaRPr lang="en-US"/>
           </a:p>
@@ -822,7 +823,7 @@
           <a:p>
             <a:fld id="{78C97017-6FC3-485B-9764-EAC9E56C1D49}" type="datetimeFigureOut">
               <a:rPr lang="en-US" smtClean="0"/>
-              <a:t>10/23/18</a:t>
+              <a:t>11/10/2018</a:t>
             </a:fld>
             <a:endParaRPr lang="en-US"/>
           </a:p>
@@ -1000,7 +1001,7 @@
           <a:p>
             <a:fld id="{78C97017-6FC3-485B-9764-EAC9E56C1D49}" type="datetimeFigureOut">
               <a:rPr lang="en-US" smtClean="0"/>
-              <a:t>10/23/18</a:t>
+              <a:t>11/10/2018</a:t>
             </a:fld>
             <a:endParaRPr lang="en-US"/>
           </a:p>
@@ -1168,7 +1169,7 @@
           <a:p>
             <a:fld id="{78C97017-6FC3-485B-9764-EAC9E56C1D49}" type="datetimeFigureOut">
               <a:rPr lang="en-US" smtClean="0"/>
-              <a:t>10/23/18</a:t>
+              <a:t>11/10/2018</a:t>
             </a:fld>
             <a:endParaRPr lang="en-US"/>
           </a:p>
@@ -1413,7 +1414,7 @@
           <a:p>
             <a:fld id="{78C97017-6FC3-485B-9764-EAC9E56C1D49}" type="datetimeFigureOut">
               <a:rPr lang="en-US" smtClean="0"/>
-              <a:t>10/23/18</a:t>
+              <a:t>11/10/2018</a:t>
             </a:fld>
             <a:endParaRPr lang="en-US"/>
           </a:p>
@@ -1698,7 +1699,7 @@
           <a:p>
             <a:fld id="{78C97017-6FC3-485B-9764-EAC9E56C1D49}" type="datetimeFigureOut">
               <a:rPr lang="en-US" smtClean="0"/>
-              <a:t>10/23/18</a:t>
+              <a:t>11/10/2018</a:t>
             </a:fld>
             <a:endParaRPr lang="en-US"/>
           </a:p>
@@ -2117,7 +2118,7 @@
           <a:p>
             <a:fld id="{78C97017-6FC3-485B-9764-EAC9E56C1D49}" type="datetimeFigureOut">
               <a:rPr lang="en-US" smtClean="0"/>
-              <a:t>10/23/18</a:t>
+              <a:t>11/10/2018</a:t>
             </a:fld>
             <a:endParaRPr lang="en-US"/>
           </a:p>
@@ -2234,7 +2235,7 @@
           <a:p>
             <a:fld id="{78C97017-6FC3-485B-9764-EAC9E56C1D49}" type="datetimeFigureOut">
               <a:rPr lang="en-US" smtClean="0"/>
-              <a:t>10/23/18</a:t>
+              <a:t>11/10/2018</a:t>
             </a:fld>
             <a:endParaRPr lang="en-US"/>
           </a:p>
@@ -2329,7 +2330,7 @@
           <a:p>
             <a:fld id="{78C97017-6FC3-485B-9764-EAC9E56C1D49}" type="datetimeFigureOut">
               <a:rPr lang="en-US" smtClean="0"/>
-              <a:t>10/23/18</a:t>
+              <a:t>11/10/2018</a:t>
             </a:fld>
             <a:endParaRPr lang="en-US"/>
           </a:p>
@@ -2604,7 +2605,7 @@
           <a:p>
             <a:fld id="{78C97017-6FC3-485B-9764-EAC9E56C1D49}" type="datetimeFigureOut">
               <a:rPr lang="en-US" smtClean="0"/>
-              <a:t>10/23/18</a:t>
+              <a:t>11/10/2018</a:t>
             </a:fld>
             <a:endParaRPr lang="en-US"/>
           </a:p>
@@ -2856,7 +2857,7 @@
           <a:p>
             <a:fld id="{78C97017-6FC3-485B-9764-EAC9E56C1D49}" type="datetimeFigureOut">
               <a:rPr lang="en-US" smtClean="0"/>
-              <a:t>10/23/18</a:t>
+              <a:t>11/10/2018</a:t>
             </a:fld>
             <a:endParaRPr lang="en-US"/>
           </a:p>
@@ -3067,7 +3068,7 @@
           <a:p>
             <a:fld id="{78C97017-6FC3-485B-9764-EAC9E56C1D49}" type="datetimeFigureOut">
               <a:rPr lang="en-US" smtClean="0"/>
-              <a:t>10/23/18</a:t>
+              <a:t>11/10/2018</a:t>
             </a:fld>
             <a:endParaRPr lang="en-US"/>
           </a:p>
@@ -5794,6 +5795,1631 @@
     <p:extLst>
       <p:ext uri="{BB962C8B-B14F-4D97-AF65-F5344CB8AC3E}">
         <p14:creationId xmlns:p14="http://schemas.microsoft.com/office/powerpoint/2010/main" val="2396968029"/>
+      </p:ext>
+    </p:extLst>
+  </p:cSld>
+  <p:clrMapOvr>
+    <a:masterClrMapping/>
+  </p:clrMapOvr>
+</p:sld>
+</file>
+
+<file path=ppt/slides/slide2.xml><?xml version="1.0" encoding="utf-8"?>
+<p:sld xmlns:a="http://schemas.openxmlformats.org/drawingml/2006/main" xmlns:r="http://schemas.openxmlformats.org/officeDocument/2006/relationships" xmlns:p="http://schemas.openxmlformats.org/presentationml/2006/main">
+  <p:cSld>
+    <p:spTree>
+      <p:nvGrpSpPr>
+        <p:cNvPr id="1" name=""/>
+        <p:cNvGrpSpPr/>
+        <p:nvPr/>
+      </p:nvGrpSpPr>
+      <p:grpSpPr>
+        <a:xfrm>
+          <a:off x="0" y="0"/>
+          <a:ext cx="0" cy="0"/>
+          <a:chOff x="0" y="0"/>
+          <a:chExt cx="0" cy="0"/>
+        </a:xfrm>
+      </p:grpSpPr>
+      <p:cxnSp>
+        <p:nvCxnSpPr>
+          <p:cNvPr id="95" name="Elbow Connector 63">
+            <a:extLst>
+              <a:ext uri="{FF2B5EF4-FFF2-40B4-BE49-F238E27FC236}">
+                <a16:creationId xmlns:a16="http://schemas.microsoft.com/office/drawing/2014/main" id="{FA8553AE-4B5E-4E62-8286-19742DF670C4}"/>
+              </a:ext>
+            </a:extLst>
+          </p:cNvPr>
+          <p:cNvCxnSpPr>
+            <a:cxnSpLocks/>
+          </p:cNvCxnSpPr>
+          <p:nvPr/>
+        </p:nvCxnSpPr>
+        <p:spPr>
+          <a:xfrm flipV="1">
+            <a:off x="3630769" y="3203689"/>
+            <a:ext cx="1616615" cy="382560"/>
+          </a:xfrm>
+          <a:prstGeom prst="bentConnector3">
+            <a:avLst>
+              <a:gd name="adj1" fmla="val 45059"/>
+            </a:avLst>
+          </a:prstGeom>
+          <a:ln w="19050">
+            <a:solidFill>
+              <a:srgbClr val="7030A0"/>
+            </a:solidFill>
+            <a:prstDash val="sysDot"/>
+            <a:headEnd type="none" w="med" len="med"/>
+            <a:tailEnd type="none" w="med" len="med"/>
+          </a:ln>
+          <a:effectLst/>
+        </p:spPr>
+        <p:style>
+          <a:lnRef idx="1">
+            <a:schemeClr val="accent2"/>
+          </a:lnRef>
+          <a:fillRef idx="2">
+            <a:schemeClr val="accent2"/>
+          </a:fillRef>
+          <a:effectRef idx="1">
+            <a:schemeClr val="accent2"/>
+          </a:effectRef>
+          <a:fontRef idx="minor">
+            <a:schemeClr val="dk1"/>
+          </a:fontRef>
+        </p:style>
+      </p:cxnSp>
+      <p:sp>
+        <p:nvSpPr>
+          <p:cNvPr id="100" name="Rectangle 8"/>
+          <p:cNvSpPr/>
+          <p:nvPr/>
+        </p:nvSpPr>
+        <p:spPr>
+          <a:xfrm>
+            <a:off x="410999" y="421512"/>
+            <a:ext cx="1443661" cy="364396"/>
+          </a:xfrm>
+          <a:prstGeom prst="rect">
+            <a:avLst/>
+          </a:prstGeom>
+          <a:ln w="19050">
+            <a:solidFill>
+              <a:srgbClr val="7030A0"/>
+            </a:solidFill>
+          </a:ln>
+          <a:effectLst/>
+        </p:spPr>
+        <p:style>
+          <a:lnRef idx="1">
+            <a:schemeClr val="accent4"/>
+          </a:lnRef>
+          <a:fillRef idx="2">
+            <a:schemeClr val="accent4"/>
+          </a:fillRef>
+          <a:effectRef idx="1">
+            <a:schemeClr val="accent4"/>
+          </a:effectRef>
+          <a:fontRef idx="minor">
+            <a:schemeClr val="dk1"/>
+          </a:fontRef>
+        </p:style>
+        <p:txBody>
+          <a:bodyPr rtlCol="0" anchor="ctr"/>
+          <a:lstStyle/>
+          <a:p>
+            <a:pPr algn="ctr"/>
+            <a:r>
+              <a:rPr lang="en-US" sz="1050" dirty="0">
+                <a:solidFill>
+                  <a:srgbClr val="7030A0"/>
+                </a:solidFill>
+              </a:rPr>
+              <a:t>{abstract}</a:t>
+            </a:r>
+            <a:br>
+              <a:rPr lang="en-US" sz="1050" dirty="0">
+                <a:solidFill>
+                  <a:srgbClr val="7030A0"/>
+                </a:solidFill>
+              </a:rPr>
+            </a:br>
+            <a:r>
+              <a:rPr lang="en-US" sz="1050" dirty="0">
+                <a:solidFill>
+                  <a:srgbClr val="7030A0"/>
+                </a:solidFill>
+              </a:rPr>
+              <a:t>command</a:t>
+            </a:r>
+            <a:endParaRPr lang="en-SG" sz="1050" dirty="0">
+              <a:solidFill>
+                <a:srgbClr val="7030A0"/>
+              </a:solidFill>
+            </a:endParaRPr>
+          </a:p>
+        </p:txBody>
+      </p:sp>
+      <p:sp>
+        <p:nvSpPr>
+          <p:cNvPr id="57" name="Isosceles Triangle 102">
+            <a:extLst>
+              <a:ext uri="{FF2B5EF4-FFF2-40B4-BE49-F238E27FC236}">
+                <a16:creationId xmlns:a16="http://schemas.microsoft.com/office/drawing/2014/main" id="{0DD641D4-5E0D-4018-A7A5-FDF383D0F89F}"/>
+              </a:ext>
+            </a:extLst>
+          </p:cNvPr>
+          <p:cNvSpPr/>
+          <p:nvPr/>
+        </p:nvSpPr>
+        <p:spPr>
+          <a:xfrm>
+            <a:off x="997322" y="785908"/>
+            <a:ext cx="271014" cy="216842"/>
+          </a:xfrm>
+          <a:prstGeom prst="triangle">
+            <a:avLst>
+              <a:gd name="adj" fmla="val 44517"/>
+            </a:avLst>
+          </a:prstGeom>
+          <a:solidFill>
+            <a:schemeClr val="accent4">
+              <a:lumMod val="20000"/>
+              <a:lumOff val="80000"/>
+            </a:schemeClr>
+          </a:solidFill>
+          <a:ln w="19050">
+            <a:solidFill>
+              <a:srgbClr val="7030A0"/>
+            </a:solidFill>
+          </a:ln>
+          <a:effectLst/>
+        </p:spPr>
+        <p:style>
+          <a:lnRef idx="1">
+            <a:schemeClr val="accent6"/>
+          </a:lnRef>
+          <a:fillRef idx="2">
+            <a:schemeClr val="accent6"/>
+          </a:fillRef>
+          <a:effectRef idx="1">
+            <a:schemeClr val="accent6"/>
+          </a:effectRef>
+          <a:fontRef idx="minor">
+            <a:schemeClr val="dk1"/>
+          </a:fontRef>
+        </p:style>
+        <p:txBody>
+          <a:bodyPr rtlCol="0" anchor="ctr"/>
+          <a:lstStyle/>
+          <a:p>
+            <a:pPr algn="ctr"/>
+            <a:endParaRPr lang="en-SG" sz="1050"/>
+          </a:p>
+        </p:txBody>
+      </p:sp>
+      <p:cxnSp>
+        <p:nvCxnSpPr>
+          <p:cNvPr id="67" name="Elbow Connector 63">
+            <a:extLst>
+              <a:ext uri="{FF2B5EF4-FFF2-40B4-BE49-F238E27FC236}">
+                <a16:creationId xmlns:a16="http://schemas.microsoft.com/office/drawing/2014/main" id="{5AB84FEB-2FE6-4ABC-B03F-C8189B23FC27}"/>
+              </a:ext>
+            </a:extLst>
+          </p:cNvPr>
+          <p:cNvCxnSpPr>
+            <a:cxnSpLocks/>
+          </p:cNvCxnSpPr>
+          <p:nvPr/>
+        </p:nvCxnSpPr>
+        <p:spPr>
+          <a:xfrm rot="16200000" flipH="1">
+            <a:off x="1117230" y="1018349"/>
+            <a:ext cx="409362" cy="378164"/>
+          </a:xfrm>
+          <a:prstGeom prst="bentConnector3">
+            <a:avLst>
+              <a:gd name="adj1" fmla="val 50000"/>
+            </a:avLst>
+          </a:prstGeom>
+          <a:ln w="19050">
+            <a:solidFill>
+              <a:srgbClr val="7030A0"/>
+            </a:solidFill>
+            <a:prstDash val="sysDot"/>
+            <a:headEnd type="none" w="med" len="med"/>
+            <a:tailEnd type="none" w="med" len="med"/>
+          </a:ln>
+          <a:effectLst/>
+        </p:spPr>
+        <p:style>
+          <a:lnRef idx="1">
+            <a:schemeClr val="accent2"/>
+          </a:lnRef>
+          <a:fillRef idx="2">
+            <a:schemeClr val="accent2"/>
+          </a:fillRef>
+          <a:effectRef idx="1">
+            <a:schemeClr val="accent2"/>
+          </a:effectRef>
+          <a:fontRef idx="minor">
+            <a:schemeClr val="dk1"/>
+          </a:fontRef>
+        </p:style>
+      </p:cxnSp>
+      <p:sp>
+        <p:nvSpPr>
+          <p:cNvPr id="71" name="Rectangle 8">
+            <a:extLst>
+              <a:ext uri="{FF2B5EF4-FFF2-40B4-BE49-F238E27FC236}">
+                <a16:creationId xmlns:a16="http://schemas.microsoft.com/office/drawing/2014/main" id="{E97DB873-6884-4DF8-9737-48DAB26873D0}"/>
+              </a:ext>
+            </a:extLst>
+          </p:cNvPr>
+          <p:cNvSpPr/>
+          <p:nvPr/>
+        </p:nvSpPr>
+        <p:spPr>
+          <a:xfrm>
+            <a:off x="774366" y="1367144"/>
+            <a:ext cx="2684633" cy="3397757"/>
+          </a:xfrm>
+          <a:prstGeom prst="rect">
+            <a:avLst/>
+          </a:prstGeom>
+          <a:ln w="19050">
+            <a:solidFill>
+              <a:srgbClr val="7030A0"/>
+            </a:solidFill>
+          </a:ln>
+          <a:effectLst/>
+        </p:spPr>
+        <p:style>
+          <a:lnRef idx="1">
+            <a:schemeClr val="accent4"/>
+          </a:lnRef>
+          <a:fillRef idx="2">
+            <a:schemeClr val="accent4"/>
+          </a:fillRef>
+          <a:effectRef idx="1">
+            <a:schemeClr val="accent4"/>
+          </a:effectRef>
+          <a:fontRef idx="minor">
+            <a:schemeClr val="dk1"/>
+          </a:fontRef>
+        </p:style>
+        <p:txBody>
+          <a:bodyPr rtlCol="0" anchor="t" anchorCtr="0"/>
+          <a:lstStyle/>
+          <a:p>
+            <a:pPr algn="ctr"/>
+            <a:r>
+              <a:rPr lang="en-US" sz="1050" dirty="0">
+                <a:solidFill>
+                  <a:srgbClr val="7030A0"/>
+                </a:solidFill>
+              </a:rPr>
+              <a:t>{abstract}</a:t>
+            </a:r>
+            <a:br>
+              <a:rPr lang="en-US" sz="1050" dirty="0">
+                <a:solidFill>
+                  <a:srgbClr val="7030A0"/>
+                </a:solidFill>
+              </a:rPr>
+            </a:br>
+            <a:r>
+              <a:rPr lang="en-US" sz="1050" dirty="0" err="1">
+                <a:solidFill>
+                  <a:srgbClr val="7030A0"/>
+                </a:solidFill>
+              </a:rPr>
+              <a:t>downloadAbstract</a:t>
+            </a:r>
+            <a:endParaRPr lang="en-US" sz="1050" dirty="0">
+              <a:solidFill>
+                <a:srgbClr val="7030A0"/>
+              </a:solidFill>
+            </a:endParaRPr>
+          </a:p>
+          <a:p>
+            <a:pPr algn="ctr"/>
+            <a:endParaRPr lang="en-US" sz="1050" dirty="0">
+              <a:solidFill>
+                <a:srgbClr val="7030A0"/>
+              </a:solidFill>
+            </a:endParaRPr>
+          </a:p>
+          <a:p>
+            <a:pPr algn="ctr"/>
+            <a:r>
+              <a:rPr lang="en-US" sz="1050" dirty="0">
+                <a:solidFill>
+                  <a:srgbClr val="7030A0"/>
+                </a:solidFill>
+              </a:rPr>
+              <a:t>#username: String</a:t>
+            </a:r>
+          </a:p>
+          <a:p>
+            <a:pPr algn="ctr"/>
+            <a:r>
+              <a:rPr lang="en-US" sz="1050" dirty="0">
+                <a:solidFill>
+                  <a:srgbClr val="7030A0"/>
+                </a:solidFill>
+              </a:rPr>
+              <a:t>#password: String</a:t>
+            </a:r>
+          </a:p>
+          <a:p>
+            <a:pPr algn="ctr"/>
+            <a:r>
+              <a:rPr lang="en-US" sz="1050" dirty="0">
+                <a:solidFill>
+                  <a:srgbClr val="7030A0"/>
+                </a:solidFill>
+              </a:rPr>
+              <a:t>#</a:t>
+            </a:r>
+            <a:r>
+              <a:rPr lang="en-US" sz="1050" dirty="0" err="1">
+                <a:solidFill>
+                  <a:srgbClr val="7030A0"/>
+                </a:solidFill>
+              </a:rPr>
+              <a:t>moduleCode</a:t>
+            </a:r>
+            <a:r>
+              <a:rPr lang="en-US" sz="1050" dirty="0">
+                <a:solidFill>
+                  <a:srgbClr val="7030A0"/>
+                </a:solidFill>
+              </a:rPr>
+              <a:t>: String</a:t>
+            </a:r>
+          </a:p>
+          <a:p>
+            <a:pPr algn="ctr"/>
+            <a:r>
+              <a:rPr lang="en-US" sz="1050" dirty="0">
+                <a:solidFill>
+                  <a:srgbClr val="7030A0"/>
+                </a:solidFill>
+              </a:rPr>
+              <a:t>#</a:t>
+            </a:r>
+            <a:r>
+              <a:rPr lang="en-US" sz="1050" dirty="0" err="1">
+                <a:solidFill>
+                  <a:srgbClr val="7030A0"/>
+                </a:solidFill>
+              </a:rPr>
+              <a:t>currentDirectoryPath</a:t>
+            </a:r>
+            <a:r>
+              <a:rPr lang="en-US" sz="1050" dirty="0">
+                <a:solidFill>
+                  <a:srgbClr val="7030A0"/>
+                </a:solidFill>
+              </a:rPr>
+              <a:t>: String</a:t>
+            </a:r>
+          </a:p>
+          <a:p>
+            <a:pPr algn="ctr"/>
+            <a:r>
+              <a:rPr lang="en-US" sz="1050" dirty="0">
+                <a:solidFill>
+                  <a:srgbClr val="7030A0"/>
+                </a:solidFill>
+              </a:rPr>
+              <a:t>#</a:t>
+            </a:r>
+            <a:r>
+              <a:rPr lang="en-US" sz="1050" dirty="0" err="1">
+                <a:solidFill>
+                  <a:srgbClr val="7030A0"/>
+                </a:solidFill>
+              </a:rPr>
+              <a:t>downloadPath</a:t>
+            </a:r>
+            <a:r>
+              <a:rPr lang="en-US" sz="1050" dirty="0">
+                <a:solidFill>
+                  <a:srgbClr val="7030A0"/>
+                </a:solidFill>
+              </a:rPr>
+              <a:t>: String</a:t>
+            </a:r>
+          </a:p>
+          <a:p>
+            <a:pPr algn="ctr"/>
+            <a:r>
+              <a:rPr lang="en-US" sz="1050" dirty="0">
+                <a:solidFill>
+                  <a:srgbClr val="7030A0"/>
+                </a:solidFill>
+              </a:rPr>
+              <a:t>#</a:t>
+            </a:r>
+            <a:r>
+              <a:rPr lang="en-US" sz="1050" dirty="0" err="1">
+                <a:solidFill>
+                  <a:srgbClr val="7030A0"/>
+                </a:solidFill>
+              </a:rPr>
+              <a:t>isDownloadDisabled</a:t>
+            </a:r>
+            <a:r>
+              <a:rPr lang="en-US" sz="1050" dirty="0">
+                <a:solidFill>
+                  <a:srgbClr val="7030A0"/>
+                </a:solidFill>
+              </a:rPr>
+              <a:t>: Boolean</a:t>
+            </a:r>
+          </a:p>
+          <a:p>
+            <a:pPr algn="ctr"/>
+            <a:endParaRPr lang="en-US" sz="1050" dirty="0">
+              <a:solidFill>
+                <a:srgbClr val="7030A0"/>
+              </a:solidFill>
+            </a:endParaRPr>
+          </a:p>
+          <a:p>
+            <a:pPr algn="ctr"/>
+            <a:r>
+              <a:rPr lang="en-US" sz="1050" dirty="0">
+                <a:solidFill>
+                  <a:srgbClr val="7030A0"/>
+                </a:solidFill>
+              </a:rPr>
+              <a:t>#</a:t>
+            </a:r>
+            <a:r>
+              <a:rPr lang="en-US" sz="1050" dirty="0" err="1">
+                <a:solidFill>
+                  <a:srgbClr val="7030A0"/>
+                </a:solidFill>
+              </a:rPr>
+              <a:t>extractFilesFromJar</a:t>
+            </a:r>
+            <a:r>
+              <a:rPr lang="en-US" sz="1050" dirty="0">
+                <a:solidFill>
+                  <a:srgbClr val="7030A0"/>
+                </a:solidFill>
+              </a:rPr>
+              <a:t>() : void</a:t>
+            </a:r>
+          </a:p>
+          <a:p>
+            <a:pPr algn="ctr"/>
+            <a:r>
+              <a:rPr lang="en-US" sz="1050" dirty="0">
+                <a:solidFill>
+                  <a:srgbClr val="7030A0"/>
+                </a:solidFill>
+              </a:rPr>
+              <a:t>#</a:t>
+            </a:r>
+            <a:r>
+              <a:rPr lang="en-US" sz="1050" dirty="0" err="1">
+                <a:solidFill>
+                  <a:srgbClr val="7030A0"/>
+                </a:solidFill>
+              </a:rPr>
+              <a:t>initializeChromeDriverPaths</a:t>
+            </a:r>
+            <a:r>
+              <a:rPr lang="en-US" sz="1050" dirty="0">
+                <a:solidFill>
+                  <a:srgbClr val="7030A0"/>
+                </a:solidFill>
+              </a:rPr>
+              <a:t>(): void</a:t>
+            </a:r>
+          </a:p>
+          <a:p>
+            <a:pPr algn="ctr"/>
+            <a:r>
+              <a:rPr lang="en-US" sz="1050" dirty="0">
+                <a:solidFill>
+                  <a:srgbClr val="7030A0"/>
+                </a:solidFill>
+              </a:rPr>
+              <a:t>#</a:t>
+            </a:r>
+            <a:r>
+              <a:rPr lang="en-US" sz="1050" dirty="0" err="1">
+                <a:solidFill>
+                  <a:srgbClr val="7030A0"/>
+                </a:solidFill>
+              </a:rPr>
+              <a:t>initializeWebDriver</a:t>
+            </a:r>
+            <a:r>
+              <a:rPr lang="en-US" sz="1050" dirty="0">
+                <a:solidFill>
+                  <a:srgbClr val="7030A0"/>
+                </a:solidFill>
+              </a:rPr>
+              <a:t>(): void</a:t>
+            </a:r>
+          </a:p>
+          <a:p>
+            <a:pPr algn="ctr"/>
+            <a:r>
+              <a:rPr lang="en-US" sz="1050" dirty="0">
+                <a:solidFill>
+                  <a:srgbClr val="7030A0"/>
+                </a:solidFill>
+              </a:rPr>
+              <a:t>#</a:t>
+            </a:r>
+            <a:r>
+              <a:rPr lang="en-US" sz="1050" dirty="0" err="1">
+                <a:solidFill>
+                  <a:srgbClr val="7030A0"/>
+                </a:solidFill>
+              </a:rPr>
+              <a:t>isModuleExisting</a:t>
+            </a:r>
+            <a:r>
+              <a:rPr lang="en-US" sz="1050" dirty="0">
+                <a:solidFill>
+                  <a:srgbClr val="7030A0"/>
+                </a:solidFill>
+              </a:rPr>
+              <a:t>(WebDriver): Boolean</a:t>
+            </a:r>
+          </a:p>
+          <a:p>
+            <a:pPr algn="ctr"/>
+            <a:r>
+              <a:rPr lang="en-US" sz="1050" dirty="0">
+                <a:solidFill>
+                  <a:srgbClr val="7030A0"/>
+                </a:solidFill>
+              </a:rPr>
+              <a:t>#</a:t>
+            </a:r>
+            <a:r>
+              <a:rPr lang="en-US" sz="1050" dirty="0" err="1">
+                <a:solidFill>
+                  <a:srgbClr val="7030A0"/>
+                </a:solidFill>
+              </a:rPr>
+              <a:t>isModuleMatching</a:t>
+            </a:r>
+            <a:r>
+              <a:rPr lang="en-US" sz="1050" dirty="0">
+                <a:solidFill>
+                  <a:srgbClr val="7030A0"/>
+                </a:solidFill>
+              </a:rPr>
+              <a:t>(String): Boolean</a:t>
+            </a:r>
+          </a:p>
+          <a:p>
+            <a:pPr algn="ctr"/>
+            <a:r>
+              <a:rPr lang="en-US" sz="1050" dirty="0">
+                <a:solidFill>
+                  <a:srgbClr val="7030A0"/>
+                </a:solidFill>
+              </a:rPr>
+              <a:t>#</a:t>
+            </a:r>
+            <a:r>
+              <a:rPr lang="en-US" sz="1050" dirty="0" err="1">
+                <a:solidFill>
+                  <a:srgbClr val="7030A0"/>
+                </a:solidFill>
+              </a:rPr>
+              <a:t>isLoggedIn</a:t>
+            </a:r>
+            <a:r>
+              <a:rPr lang="en-US" sz="1050" dirty="0">
+                <a:solidFill>
+                  <a:srgbClr val="7030A0"/>
+                </a:solidFill>
+              </a:rPr>
+              <a:t>(WebDriver): Boolean</a:t>
+            </a:r>
+          </a:p>
+          <a:p>
+            <a:pPr algn="ctr"/>
+            <a:r>
+              <a:rPr lang="en-US" sz="1050" dirty="0">
+                <a:solidFill>
+                  <a:srgbClr val="7030A0"/>
+                </a:solidFill>
+              </a:rPr>
+              <a:t>#</a:t>
+            </a:r>
+            <a:r>
+              <a:rPr lang="en-US" sz="1050" dirty="0" err="1">
+                <a:solidFill>
+                  <a:srgbClr val="7030A0"/>
+                </a:solidFill>
+              </a:rPr>
+              <a:t>loginIvle</a:t>
+            </a:r>
+            <a:r>
+              <a:rPr lang="en-US" sz="1050" dirty="0">
+                <a:solidFill>
+                  <a:srgbClr val="7030A0"/>
+                </a:solidFill>
+              </a:rPr>
+              <a:t>(WebDriver): void</a:t>
+            </a:r>
+          </a:p>
+          <a:p>
+            <a:pPr algn="ctr"/>
+            <a:r>
+              <a:rPr lang="en-US" sz="1050" dirty="0">
+                <a:solidFill>
+                  <a:srgbClr val="7030A0"/>
+                </a:solidFill>
+              </a:rPr>
+              <a:t>#</a:t>
+            </a:r>
+            <a:r>
+              <a:rPr lang="en-US" sz="1050" dirty="0" err="1">
+                <a:solidFill>
+                  <a:srgbClr val="7030A0"/>
+                </a:solidFill>
+              </a:rPr>
+              <a:t>downloadFiles</a:t>
+            </a:r>
+            <a:r>
+              <a:rPr lang="en-US" sz="1050" dirty="0">
+                <a:solidFill>
+                  <a:srgbClr val="7030A0"/>
+                </a:solidFill>
+              </a:rPr>
+              <a:t>(WebDriver): void {abstract}</a:t>
+            </a:r>
+          </a:p>
+          <a:p>
+            <a:pPr algn="ctr"/>
+            <a:r>
+              <a:rPr lang="en-US" sz="1050" dirty="0">
+                <a:solidFill>
+                  <a:srgbClr val="7030A0"/>
+                </a:solidFill>
+              </a:rPr>
+              <a:t>#</a:t>
+            </a:r>
+            <a:r>
+              <a:rPr lang="en-US" sz="1050" dirty="0" err="1">
+                <a:solidFill>
+                  <a:srgbClr val="7030A0"/>
+                </a:solidFill>
+              </a:rPr>
+              <a:t>dynamicWaiting</a:t>
+            </a:r>
+            <a:r>
+              <a:rPr lang="en-US" sz="1050" dirty="0">
+                <a:solidFill>
+                  <a:srgbClr val="7030A0"/>
+                </a:solidFill>
+              </a:rPr>
+              <a:t>(): void</a:t>
+            </a:r>
+          </a:p>
+          <a:p>
+            <a:pPr algn="ctr"/>
+            <a:r>
+              <a:rPr lang="en-US" sz="1050" dirty="0">
+                <a:solidFill>
+                  <a:srgbClr val="7030A0"/>
+                </a:solidFill>
+              </a:rPr>
+              <a:t>#</a:t>
+            </a:r>
+            <a:r>
+              <a:rPr lang="en-US" sz="1050" dirty="0" err="1">
+                <a:solidFill>
+                  <a:srgbClr val="7030A0"/>
+                </a:solidFill>
+              </a:rPr>
+              <a:t>initializeDownloadFolder</a:t>
+            </a:r>
+            <a:r>
+              <a:rPr lang="en-US" sz="1050" dirty="0">
+                <a:solidFill>
+                  <a:srgbClr val="7030A0"/>
+                </a:solidFill>
+              </a:rPr>
+              <a:t>(): void</a:t>
+            </a:r>
+          </a:p>
+          <a:p>
+            <a:pPr algn="ctr"/>
+            <a:endParaRPr lang="en-US" sz="1050" dirty="0">
+              <a:solidFill>
+                <a:srgbClr val="7030A0"/>
+              </a:solidFill>
+            </a:endParaRPr>
+          </a:p>
+        </p:txBody>
+      </p:sp>
+      <p:cxnSp>
+        <p:nvCxnSpPr>
+          <p:cNvPr id="6" name="Straight Connector 5">
+            <a:extLst>
+              <a:ext uri="{FF2B5EF4-FFF2-40B4-BE49-F238E27FC236}">
+                <a16:creationId xmlns:a16="http://schemas.microsoft.com/office/drawing/2014/main" id="{C3013767-DCFA-4FD6-A13A-24C5C382E743}"/>
+              </a:ext>
+            </a:extLst>
+          </p:cNvPr>
+          <p:cNvCxnSpPr>
+            <a:cxnSpLocks/>
+          </p:cNvCxnSpPr>
+          <p:nvPr/>
+        </p:nvCxnSpPr>
+        <p:spPr>
+          <a:xfrm>
+            <a:off x="786441" y="1793112"/>
+            <a:ext cx="2672558" cy="0"/>
+          </a:xfrm>
+          <a:prstGeom prst="line">
+            <a:avLst/>
+          </a:prstGeom>
+        </p:spPr>
+        <p:style>
+          <a:lnRef idx="1">
+            <a:schemeClr val="accent4"/>
+          </a:lnRef>
+          <a:fillRef idx="0">
+            <a:schemeClr val="accent4"/>
+          </a:fillRef>
+          <a:effectRef idx="0">
+            <a:schemeClr val="accent4"/>
+          </a:effectRef>
+          <a:fontRef idx="minor">
+            <a:schemeClr val="tx1"/>
+          </a:fontRef>
+        </p:style>
+      </p:cxnSp>
+      <p:cxnSp>
+        <p:nvCxnSpPr>
+          <p:cNvPr id="72" name="Straight Connector 71">
+            <a:extLst>
+              <a:ext uri="{FF2B5EF4-FFF2-40B4-BE49-F238E27FC236}">
+                <a16:creationId xmlns:a16="http://schemas.microsoft.com/office/drawing/2014/main" id="{15FC0C90-F633-48C3-9FC7-EC8ACFB7CA02}"/>
+              </a:ext>
+            </a:extLst>
+          </p:cNvPr>
+          <p:cNvCxnSpPr>
+            <a:cxnSpLocks/>
+          </p:cNvCxnSpPr>
+          <p:nvPr/>
+        </p:nvCxnSpPr>
+        <p:spPr>
+          <a:xfrm>
+            <a:off x="769829" y="2936112"/>
+            <a:ext cx="2697001" cy="0"/>
+          </a:xfrm>
+          <a:prstGeom prst="line">
+            <a:avLst/>
+          </a:prstGeom>
+        </p:spPr>
+        <p:style>
+          <a:lnRef idx="1">
+            <a:schemeClr val="accent4"/>
+          </a:lnRef>
+          <a:fillRef idx="0">
+            <a:schemeClr val="accent4"/>
+          </a:fillRef>
+          <a:effectRef idx="0">
+            <a:schemeClr val="accent4"/>
+          </a:effectRef>
+          <a:fontRef idx="minor">
+            <a:schemeClr val="tx1"/>
+          </a:fontRef>
+        </p:style>
+      </p:cxnSp>
+      <p:sp>
+        <p:nvSpPr>
+          <p:cNvPr id="73" name="Isosceles Triangle 102">
+            <a:extLst>
+              <a:ext uri="{FF2B5EF4-FFF2-40B4-BE49-F238E27FC236}">
+                <a16:creationId xmlns:a16="http://schemas.microsoft.com/office/drawing/2014/main" id="{42BA6344-935C-47A2-9097-33754A9B17DF}"/>
+              </a:ext>
+            </a:extLst>
+          </p:cNvPr>
+          <p:cNvSpPr/>
+          <p:nvPr/>
+        </p:nvSpPr>
+        <p:spPr>
+          <a:xfrm rot="16200000">
+            <a:off x="3439744" y="1978778"/>
+            <a:ext cx="271014" cy="216842"/>
+          </a:xfrm>
+          <a:prstGeom prst="triangle">
+            <a:avLst>
+              <a:gd name="adj" fmla="val 44517"/>
+            </a:avLst>
+          </a:prstGeom>
+          <a:solidFill>
+            <a:schemeClr val="accent4">
+              <a:lumMod val="20000"/>
+              <a:lumOff val="80000"/>
+            </a:schemeClr>
+          </a:solidFill>
+          <a:ln w="19050">
+            <a:solidFill>
+              <a:srgbClr val="7030A0"/>
+            </a:solidFill>
+          </a:ln>
+          <a:effectLst/>
+        </p:spPr>
+        <p:style>
+          <a:lnRef idx="1">
+            <a:schemeClr val="accent6"/>
+          </a:lnRef>
+          <a:fillRef idx="2">
+            <a:schemeClr val="accent6"/>
+          </a:fillRef>
+          <a:effectRef idx="1">
+            <a:schemeClr val="accent6"/>
+          </a:effectRef>
+          <a:fontRef idx="minor">
+            <a:schemeClr val="dk1"/>
+          </a:fontRef>
+        </p:style>
+        <p:txBody>
+          <a:bodyPr rtlCol="0" anchor="ctr"/>
+          <a:lstStyle/>
+          <a:p>
+            <a:pPr algn="ctr"/>
+            <a:endParaRPr lang="en-SG" sz="1050"/>
+          </a:p>
+        </p:txBody>
+      </p:sp>
+      <p:cxnSp>
+        <p:nvCxnSpPr>
+          <p:cNvPr id="77" name="Elbow Connector 63">
+            <a:extLst>
+              <a:ext uri="{FF2B5EF4-FFF2-40B4-BE49-F238E27FC236}">
+                <a16:creationId xmlns:a16="http://schemas.microsoft.com/office/drawing/2014/main" id="{5CC0ED49-FE92-4ADF-AE24-4D8CEB39C85B}"/>
+              </a:ext>
+            </a:extLst>
+          </p:cNvPr>
+          <p:cNvCxnSpPr>
+            <a:cxnSpLocks/>
+            <a:stCxn id="73" idx="3"/>
+          </p:cNvCxnSpPr>
+          <p:nvPr/>
+        </p:nvCxnSpPr>
+        <p:spPr>
+          <a:xfrm flipV="1">
+            <a:off x="3683672" y="1719499"/>
+            <a:ext cx="1616615" cy="382560"/>
+          </a:xfrm>
+          <a:prstGeom prst="bentConnector3">
+            <a:avLst>
+              <a:gd name="adj1" fmla="val 50001"/>
+            </a:avLst>
+          </a:prstGeom>
+          <a:ln w="19050">
+            <a:solidFill>
+              <a:srgbClr val="7030A0"/>
+            </a:solidFill>
+            <a:prstDash val="sysDot"/>
+            <a:headEnd type="none" w="med" len="med"/>
+            <a:tailEnd type="none" w="med" len="med"/>
+          </a:ln>
+          <a:effectLst/>
+        </p:spPr>
+        <p:style>
+          <a:lnRef idx="1">
+            <a:schemeClr val="accent2"/>
+          </a:lnRef>
+          <a:fillRef idx="2">
+            <a:schemeClr val="accent2"/>
+          </a:fillRef>
+          <a:effectRef idx="1">
+            <a:schemeClr val="accent2"/>
+          </a:effectRef>
+          <a:fontRef idx="minor">
+            <a:schemeClr val="dk1"/>
+          </a:fontRef>
+        </p:style>
+      </p:cxnSp>
+      <p:sp>
+        <p:nvSpPr>
+          <p:cNvPr id="87" name="Rectangle 8">
+            <a:extLst>
+              <a:ext uri="{FF2B5EF4-FFF2-40B4-BE49-F238E27FC236}">
+                <a16:creationId xmlns:a16="http://schemas.microsoft.com/office/drawing/2014/main" id="{D1751E24-E5A7-46B9-9C7F-5841BFF3A924}"/>
+              </a:ext>
+            </a:extLst>
+          </p:cNvPr>
+          <p:cNvSpPr/>
+          <p:nvPr/>
+        </p:nvSpPr>
+        <p:spPr>
+          <a:xfrm>
+            <a:off x="4336503" y="576851"/>
+            <a:ext cx="2697000" cy="1216261"/>
+          </a:xfrm>
+          <a:prstGeom prst="rect">
+            <a:avLst/>
+          </a:prstGeom>
+          <a:ln w="19050">
+            <a:solidFill>
+              <a:srgbClr val="7030A0"/>
+            </a:solidFill>
+          </a:ln>
+          <a:effectLst/>
+        </p:spPr>
+        <p:style>
+          <a:lnRef idx="1">
+            <a:schemeClr val="accent4"/>
+          </a:lnRef>
+          <a:fillRef idx="2">
+            <a:schemeClr val="accent4"/>
+          </a:fillRef>
+          <a:effectRef idx="1">
+            <a:schemeClr val="accent4"/>
+          </a:effectRef>
+          <a:fontRef idx="minor">
+            <a:schemeClr val="dk1"/>
+          </a:fontRef>
+        </p:style>
+        <p:txBody>
+          <a:bodyPr rtlCol="0" anchor="t" anchorCtr="0"/>
+          <a:lstStyle/>
+          <a:p>
+            <a:pPr algn="ctr"/>
+            <a:r>
+              <a:rPr lang="en-US" sz="1050" dirty="0" err="1">
+                <a:solidFill>
+                  <a:srgbClr val="7030A0"/>
+                </a:solidFill>
+              </a:rPr>
+              <a:t>DownloadAllNotes</a:t>
+            </a:r>
+            <a:endParaRPr lang="en-US" sz="1050" dirty="0">
+              <a:solidFill>
+                <a:srgbClr val="7030A0"/>
+              </a:solidFill>
+            </a:endParaRPr>
+          </a:p>
+          <a:p>
+            <a:pPr algn="ctr"/>
+            <a:endParaRPr lang="en-US" sz="1050" dirty="0">
+              <a:solidFill>
+                <a:srgbClr val="7030A0"/>
+              </a:solidFill>
+            </a:endParaRPr>
+          </a:p>
+          <a:p>
+            <a:pPr algn="ctr"/>
+            <a:endParaRPr lang="en-US" sz="1050" dirty="0">
+              <a:solidFill>
+                <a:srgbClr val="7030A0"/>
+              </a:solidFill>
+            </a:endParaRPr>
+          </a:p>
+          <a:p>
+            <a:pPr algn="ctr"/>
+            <a:endParaRPr lang="en-US" sz="1050" dirty="0">
+              <a:solidFill>
+                <a:srgbClr val="7030A0"/>
+              </a:solidFill>
+            </a:endParaRPr>
+          </a:p>
+          <a:p>
+            <a:pPr algn="ctr"/>
+            <a:r>
+              <a:rPr lang="en-US" sz="1050" dirty="0">
+                <a:solidFill>
+                  <a:srgbClr val="7030A0"/>
+                </a:solidFill>
+              </a:rPr>
+              <a:t>+</a:t>
+            </a:r>
+            <a:r>
+              <a:rPr lang="en-US" sz="1050" dirty="0" err="1">
+                <a:solidFill>
+                  <a:srgbClr val="7030A0"/>
+                </a:solidFill>
+              </a:rPr>
+              <a:t>CommandResult</a:t>
+            </a:r>
+            <a:r>
+              <a:rPr lang="en-US" sz="1050" dirty="0">
+                <a:solidFill>
+                  <a:srgbClr val="7030A0"/>
+                </a:solidFill>
+              </a:rPr>
+              <a:t>(</a:t>
+            </a:r>
+            <a:r>
+              <a:rPr lang="en-US" sz="1050" dirty="0" err="1">
+                <a:solidFill>
+                  <a:srgbClr val="7030A0"/>
+                </a:solidFill>
+              </a:rPr>
+              <a:t>Model,CommandHistory</a:t>
+            </a:r>
+            <a:r>
+              <a:rPr lang="en-US" sz="1050" dirty="0">
+                <a:solidFill>
+                  <a:srgbClr val="7030A0"/>
+                </a:solidFill>
+              </a:rPr>
+              <a:t>):</a:t>
+            </a:r>
+          </a:p>
+          <a:p>
+            <a:pPr algn="ctr"/>
+            <a:r>
+              <a:rPr lang="en-US" sz="1050" dirty="0" err="1">
+                <a:solidFill>
+                  <a:srgbClr val="7030A0"/>
+                </a:solidFill>
+              </a:rPr>
+              <a:t>CommandResult</a:t>
+            </a:r>
+            <a:endParaRPr lang="en-US" sz="1050" dirty="0">
+              <a:solidFill>
+                <a:srgbClr val="7030A0"/>
+              </a:solidFill>
+            </a:endParaRPr>
+          </a:p>
+          <a:p>
+            <a:pPr algn="ctr"/>
+            <a:r>
+              <a:rPr lang="en-US" sz="1050" dirty="0">
+                <a:solidFill>
+                  <a:srgbClr val="7030A0"/>
+                </a:solidFill>
+              </a:rPr>
+              <a:t>#</a:t>
+            </a:r>
+            <a:r>
+              <a:rPr lang="en-US" sz="1050" dirty="0" err="1">
+                <a:solidFill>
+                  <a:srgbClr val="7030A0"/>
+                </a:solidFill>
+              </a:rPr>
+              <a:t>downloadFiles</a:t>
+            </a:r>
+            <a:r>
+              <a:rPr lang="en-US" sz="1050" dirty="0">
+                <a:solidFill>
+                  <a:srgbClr val="7030A0"/>
+                </a:solidFill>
+              </a:rPr>
+              <a:t>(WebDriver): Void</a:t>
+            </a:r>
+          </a:p>
+          <a:p>
+            <a:pPr algn="ctr"/>
+            <a:endParaRPr lang="en-US" sz="1050" dirty="0">
+              <a:solidFill>
+                <a:srgbClr val="7030A0"/>
+              </a:solidFill>
+            </a:endParaRPr>
+          </a:p>
+          <a:p>
+            <a:pPr algn="ctr"/>
+            <a:endParaRPr lang="en-US" sz="1050" dirty="0">
+              <a:solidFill>
+                <a:srgbClr val="7030A0"/>
+              </a:solidFill>
+            </a:endParaRPr>
+          </a:p>
+          <a:p>
+            <a:pPr algn="ctr"/>
+            <a:endParaRPr lang="en-SG" sz="1050" dirty="0">
+              <a:solidFill>
+                <a:srgbClr val="7030A0"/>
+              </a:solidFill>
+            </a:endParaRPr>
+          </a:p>
+        </p:txBody>
+      </p:sp>
+      <p:cxnSp>
+        <p:nvCxnSpPr>
+          <p:cNvPr id="88" name="Straight Connector 87">
+            <a:extLst>
+              <a:ext uri="{FF2B5EF4-FFF2-40B4-BE49-F238E27FC236}">
+                <a16:creationId xmlns:a16="http://schemas.microsoft.com/office/drawing/2014/main" id="{91460DFB-30D7-4FA3-A567-A4D1B7FDE2A3}"/>
+              </a:ext>
+            </a:extLst>
+          </p:cNvPr>
+          <p:cNvCxnSpPr>
+            <a:cxnSpLocks/>
+          </p:cNvCxnSpPr>
+          <p:nvPr/>
+        </p:nvCxnSpPr>
+        <p:spPr>
+          <a:xfrm>
+            <a:off x="4336503" y="1184981"/>
+            <a:ext cx="2697000" cy="0"/>
+          </a:xfrm>
+          <a:prstGeom prst="line">
+            <a:avLst/>
+          </a:prstGeom>
+        </p:spPr>
+        <p:style>
+          <a:lnRef idx="1">
+            <a:schemeClr val="accent4"/>
+          </a:lnRef>
+          <a:fillRef idx="0">
+            <a:schemeClr val="accent4"/>
+          </a:fillRef>
+          <a:effectRef idx="0">
+            <a:schemeClr val="accent4"/>
+          </a:effectRef>
+          <a:fontRef idx="minor">
+            <a:schemeClr val="tx1"/>
+          </a:fontRef>
+        </p:style>
+      </p:cxnSp>
+      <p:cxnSp>
+        <p:nvCxnSpPr>
+          <p:cNvPr id="89" name="Straight Connector 88">
+            <a:extLst>
+              <a:ext uri="{FF2B5EF4-FFF2-40B4-BE49-F238E27FC236}">
+                <a16:creationId xmlns:a16="http://schemas.microsoft.com/office/drawing/2014/main" id="{5A5C0D07-B682-484D-A480-2E18504C428E}"/>
+              </a:ext>
+            </a:extLst>
+          </p:cNvPr>
+          <p:cNvCxnSpPr>
+            <a:cxnSpLocks/>
+          </p:cNvCxnSpPr>
+          <p:nvPr/>
+        </p:nvCxnSpPr>
+        <p:spPr>
+          <a:xfrm>
+            <a:off x="4336503" y="785908"/>
+            <a:ext cx="2697000" cy="0"/>
+          </a:xfrm>
+          <a:prstGeom prst="line">
+            <a:avLst/>
+          </a:prstGeom>
+        </p:spPr>
+        <p:style>
+          <a:lnRef idx="1">
+            <a:schemeClr val="accent4"/>
+          </a:lnRef>
+          <a:fillRef idx="0">
+            <a:schemeClr val="accent4"/>
+          </a:fillRef>
+          <a:effectRef idx="0">
+            <a:schemeClr val="accent4"/>
+          </a:effectRef>
+          <a:fontRef idx="minor">
+            <a:schemeClr val="tx1"/>
+          </a:fontRef>
+        </p:style>
+      </p:cxnSp>
+      <p:sp>
+        <p:nvSpPr>
+          <p:cNvPr id="91" name="Rectangle 8">
+            <a:extLst>
+              <a:ext uri="{FF2B5EF4-FFF2-40B4-BE49-F238E27FC236}">
+                <a16:creationId xmlns:a16="http://schemas.microsoft.com/office/drawing/2014/main" id="{033DAA71-BE3C-45BE-807A-B01892E5E7BF}"/>
+              </a:ext>
+            </a:extLst>
+          </p:cNvPr>
+          <p:cNvSpPr/>
+          <p:nvPr/>
+        </p:nvSpPr>
+        <p:spPr>
+          <a:xfrm>
+            <a:off x="4346120" y="3066023"/>
+            <a:ext cx="2697000" cy="1429778"/>
+          </a:xfrm>
+          <a:prstGeom prst="rect">
+            <a:avLst/>
+          </a:prstGeom>
+          <a:ln w="19050">
+            <a:solidFill>
+              <a:srgbClr val="7030A0"/>
+            </a:solidFill>
+          </a:ln>
+          <a:effectLst/>
+        </p:spPr>
+        <p:style>
+          <a:lnRef idx="1">
+            <a:schemeClr val="accent4"/>
+          </a:lnRef>
+          <a:fillRef idx="2">
+            <a:schemeClr val="accent4"/>
+          </a:fillRef>
+          <a:effectRef idx="1">
+            <a:schemeClr val="accent4"/>
+          </a:effectRef>
+          <a:fontRef idx="minor">
+            <a:schemeClr val="dk1"/>
+          </a:fontRef>
+        </p:style>
+        <p:txBody>
+          <a:bodyPr rtlCol="0" anchor="t" anchorCtr="0"/>
+          <a:lstStyle/>
+          <a:p>
+            <a:pPr algn="ctr"/>
+            <a:r>
+              <a:rPr lang="en-US" sz="1050" dirty="0" err="1">
+                <a:solidFill>
+                  <a:srgbClr val="7030A0"/>
+                </a:solidFill>
+              </a:rPr>
+              <a:t>DownloadSelectNotes</a:t>
+            </a:r>
+            <a:endParaRPr lang="en-US" sz="1050" dirty="0">
+              <a:solidFill>
+                <a:srgbClr val="7030A0"/>
+              </a:solidFill>
+            </a:endParaRPr>
+          </a:p>
+          <a:p>
+            <a:pPr algn="ctr"/>
+            <a:r>
+              <a:rPr lang="en-US" sz="1050" dirty="0">
+                <a:solidFill>
+                  <a:srgbClr val="7030A0"/>
+                </a:solidFill>
+              </a:rPr>
+              <a:t>-</a:t>
+            </a:r>
+            <a:r>
+              <a:rPr lang="en-US" sz="1050" dirty="0" err="1">
+                <a:solidFill>
+                  <a:srgbClr val="7030A0"/>
+                </a:solidFill>
+              </a:rPr>
+              <a:t>fileSelect</a:t>
+            </a:r>
+            <a:r>
+              <a:rPr lang="en-US" sz="1050" dirty="0">
+                <a:solidFill>
+                  <a:srgbClr val="7030A0"/>
+                </a:solidFill>
+              </a:rPr>
+              <a:t>: </a:t>
+            </a:r>
+            <a:r>
+              <a:rPr lang="en-US" sz="1050" dirty="0" err="1">
+                <a:solidFill>
+                  <a:srgbClr val="7030A0"/>
+                </a:solidFill>
+              </a:rPr>
+              <a:t>ArrayList</a:t>
+            </a:r>
+            <a:r>
+              <a:rPr lang="en-US" sz="1050" dirty="0">
+                <a:solidFill>
+                  <a:srgbClr val="7030A0"/>
+                </a:solidFill>
+              </a:rPr>
+              <a:t>&lt;Integer&gt;</a:t>
+            </a:r>
+          </a:p>
+          <a:p>
+            <a:pPr algn="ctr"/>
+            <a:r>
+              <a:rPr lang="en-US" sz="1050" dirty="0">
+                <a:solidFill>
+                  <a:srgbClr val="7030A0"/>
+                </a:solidFill>
+              </a:rPr>
+              <a:t>-</a:t>
+            </a:r>
+            <a:r>
+              <a:rPr lang="en-US" sz="1050" dirty="0" err="1">
+                <a:solidFill>
+                  <a:srgbClr val="7030A0"/>
+                </a:solidFill>
+              </a:rPr>
+              <a:t>availableDownloadFiles</a:t>
+            </a:r>
+            <a:r>
+              <a:rPr lang="en-US" sz="1050" dirty="0">
+                <a:solidFill>
+                  <a:srgbClr val="7030A0"/>
+                </a:solidFill>
+              </a:rPr>
+              <a:t>: String</a:t>
+            </a:r>
+          </a:p>
+          <a:p>
+            <a:pPr algn="ctr"/>
+            <a:endParaRPr lang="en-US" sz="1050" dirty="0">
+              <a:solidFill>
+                <a:srgbClr val="7030A0"/>
+              </a:solidFill>
+            </a:endParaRPr>
+          </a:p>
+          <a:p>
+            <a:pPr algn="ctr"/>
+            <a:r>
+              <a:rPr lang="en-US" sz="1050" dirty="0">
+                <a:solidFill>
+                  <a:srgbClr val="7030A0"/>
+                </a:solidFill>
+              </a:rPr>
+              <a:t>+</a:t>
+            </a:r>
+            <a:r>
+              <a:rPr lang="en-US" sz="1050" dirty="0" err="1">
+                <a:solidFill>
+                  <a:srgbClr val="7030A0"/>
+                </a:solidFill>
+              </a:rPr>
+              <a:t>CommandResult</a:t>
+            </a:r>
+            <a:r>
+              <a:rPr lang="en-US" sz="1050" dirty="0">
+                <a:solidFill>
+                  <a:srgbClr val="7030A0"/>
+                </a:solidFill>
+              </a:rPr>
+              <a:t>(</a:t>
+            </a:r>
+            <a:r>
+              <a:rPr lang="en-US" sz="1050" dirty="0" err="1">
+                <a:solidFill>
+                  <a:srgbClr val="7030A0"/>
+                </a:solidFill>
+              </a:rPr>
+              <a:t>Model,CommandHistory</a:t>
+            </a:r>
+            <a:r>
+              <a:rPr lang="en-US" sz="1050" dirty="0">
+                <a:solidFill>
+                  <a:srgbClr val="7030A0"/>
+                </a:solidFill>
+              </a:rPr>
+              <a:t>):</a:t>
+            </a:r>
+          </a:p>
+          <a:p>
+            <a:pPr algn="ctr"/>
+            <a:r>
+              <a:rPr lang="en-US" sz="1050" dirty="0" err="1">
+                <a:solidFill>
+                  <a:srgbClr val="7030A0"/>
+                </a:solidFill>
+              </a:rPr>
+              <a:t>CommandResult</a:t>
+            </a:r>
+            <a:endParaRPr lang="en-US" sz="1050" dirty="0">
+              <a:solidFill>
+                <a:srgbClr val="7030A0"/>
+              </a:solidFill>
+            </a:endParaRPr>
+          </a:p>
+          <a:p>
+            <a:pPr algn="ctr"/>
+            <a:r>
+              <a:rPr lang="en-US" sz="1050" dirty="0">
+                <a:solidFill>
+                  <a:srgbClr val="7030A0"/>
+                </a:solidFill>
+              </a:rPr>
+              <a:t>#</a:t>
+            </a:r>
+            <a:r>
+              <a:rPr lang="en-US" sz="1050" dirty="0" err="1">
+                <a:solidFill>
+                  <a:srgbClr val="7030A0"/>
+                </a:solidFill>
+              </a:rPr>
+              <a:t>downloadFiles</a:t>
+            </a:r>
+            <a:r>
+              <a:rPr lang="en-US" sz="1050" dirty="0">
+                <a:solidFill>
+                  <a:srgbClr val="7030A0"/>
+                </a:solidFill>
+              </a:rPr>
+              <a:t>(WebDriver): Void</a:t>
+            </a:r>
+          </a:p>
+          <a:p>
+            <a:pPr algn="ctr"/>
+            <a:r>
+              <a:rPr lang="en-US" sz="1050" dirty="0">
+                <a:solidFill>
+                  <a:srgbClr val="7030A0"/>
+                </a:solidFill>
+              </a:rPr>
+              <a:t>-</a:t>
+            </a:r>
+            <a:r>
+              <a:rPr lang="en-US" sz="1050" dirty="0" err="1">
+                <a:solidFill>
+                  <a:srgbClr val="7030A0"/>
+                </a:solidFill>
+              </a:rPr>
+              <a:t>getFileNames</a:t>
+            </a:r>
+            <a:r>
+              <a:rPr lang="en-US" sz="1050" dirty="0">
+                <a:solidFill>
+                  <a:srgbClr val="7030A0"/>
+                </a:solidFill>
+              </a:rPr>
+              <a:t>(WebDriver): String</a:t>
+            </a:r>
+          </a:p>
+          <a:p>
+            <a:pPr algn="ctr"/>
+            <a:endParaRPr lang="en-US" sz="1050" dirty="0">
+              <a:solidFill>
+                <a:srgbClr val="7030A0"/>
+              </a:solidFill>
+            </a:endParaRPr>
+          </a:p>
+          <a:p>
+            <a:pPr algn="ctr"/>
+            <a:endParaRPr lang="en-US" sz="1050" dirty="0">
+              <a:solidFill>
+                <a:srgbClr val="7030A0"/>
+              </a:solidFill>
+            </a:endParaRPr>
+          </a:p>
+          <a:p>
+            <a:pPr algn="ctr"/>
+            <a:endParaRPr lang="en-SG" sz="1050" dirty="0">
+              <a:solidFill>
+                <a:srgbClr val="7030A0"/>
+              </a:solidFill>
+            </a:endParaRPr>
+          </a:p>
+        </p:txBody>
+      </p:sp>
+      <p:cxnSp>
+        <p:nvCxnSpPr>
+          <p:cNvPr id="92" name="Straight Connector 91">
+            <a:extLst>
+              <a:ext uri="{FF2B5EF4-FFF2-40B4-BE49-F238E27FC236}">
+                <a16:creationId xmlns:a16="http://schemas.microsoft.com/office/drawing/2014/main" id="{F25BFC2F-1446-484B-90BC-C6119D332062}"/>
+              </a:ext>
+            </a:extLst>
+          </p:cNvPr>
+          <p:cNvCxnSpPr>
+            <a:cxnSpLocks/>
+          </p:cNvCxnSpPr>
+          <p:nvPr/>
+        </p:nvCxnSpPr>
+        <p:spPr>
+          <a:xfrm>
+            <a:off x="4336503" y="3276600"/>
+            <a:ext cx="2697000" cy="0"/>
+          </a:xfrm>
+          <a:prstGeom prst="line">
+            <a:avLst/>
+          </a:prstGeom>
+        </p:spPr>
+        <p:style>
+          <a:lnRef idx="1">
+            <a:schemeClr val="accent4"/>
+          </a:lnRef>
+          <a:fillRef idx="0">
+            <a:schemeClr val="accent4"/>
+          </a:fillRef>
+          <a:effectRef idx="0">
+            <a:schemeClr val="accent4"/>
+          </a:effectRef>
+          <a:fontRef idx="minor">
+            <a:schemeClr val="tx1"/>
+          </a:fontRef>
+        </p:style>
+      </p:cxnSp>
+      <p:cxnSp>
+        <p:nvCxnSpPr>
+          <p:cNvPr id="93" name="Straight Connector 92">
+            <a:extLst>
+              <a:ext uri="{FF2B5EF4-FFF2-40B4-BE49-F238E27FC236}">
+                <a16:creationId xmlns:a16="http://schemas.microsoft.com/office/drawing/2014/main" id="{F66EC7FC-2D6D-4C7B-B615-D941585B7A49}"/>
+              </a:ext>
+            </a:extLst>
+          </p:cNvPr>
+          <p:cNvCxnSpPr>
+            <a:cxnSpLocks/>
+          </p:cNvCxnSpPr>
+          <p:nvPr/>
+        </p:nvCxnSpPr>
+        <p:spPr>
+          <a:xfrm>
+            <a:off x="4346120" y="3657600"/>
+            <a:ext cx="2697000" cy="0"/>
+          </a:xfrm>
+          <a:prstGeom prst="line">
+            <a:avLst/>
+          </a:prstGeom>
+        </p:spPr>
+        <p:style>
+          <a:lnRef idx="1">
+            <a:schemeClr val="accent4"/>
+          </a:lnRef>
+          <a:fillRef idx="0">
+            <a:schemeClr val="accent4"/>
+          </a:fillRef>
+          <a:effectRef idx="0">
+            <a:schemeClr val="accent4"/>
+          </a:effectRef>
+          <a:fontRef idx="minor">
+            <a:schemeClr val="tx1"/>
+          </a:fontRef>
+        </p:style>
+      </p:cxnSp>
+      <p:sp>
+        <p:nvSpPr>
+          <p:cNvPr id="94" name="Isosceles Triangle 102">
+            <a:extLst>
+              <a:ext uri="{FF2B5EF4-FFF2-40B4-BE49-F238E27FC236}">
+                <a16:creationId xmlns:a16="http://schemas.microsoft.com/office/drawing/2014/main" id="{8D62B052-E0EA-4E64-80F6-0BEB30863205}"/>
+              </a:ext>
+            </a:extLst>
+          </p:cNvPr>
+          <p:cNvSpPr/>
+          <p:nvPr/>
+        </p:nvSpPr>
+        <p:spPr>
+          <a:xfrm rot="16200000">
+            <a:off x="3395841" y="3471072"/>
+            <a:ext cx="271014" cy="216842"/>
+          </a:xfrm>
+          <a:prstGeom prst="triangle">
+            <a:avLst>
+              <a:gd name="adj" fmla="val 44517"/>
+            </a:avLst>
+          </a:prstGeom>
+          <a:solidFill>
+            <a:schemeClr val="accent4">
+              <a:lumMod val="20000"/>
+              <a:lumOff val="80000"/>
+            </a:schemeClr>
+          </a:solidFill>
+          <a:ln w="19050">
+            <a:solidFill>
+              <a:srgbClr val="7030A0"/>
+            </a:solidFill>
+          </a:ln>
+          <a:effectLst/>
+        </p:spPr>
+        <p:style>
+          <a:lnRef idx="1">
+            <a:schemeClr val="accent6"/>
+          </a:lnRef>
+          <a:fillRef idx="2">
+            <a:schemeClr val="accent6"/>
+          </a:fillRef>
+          <a:effectRef idx="1">
+            <a:schemeClr val="accent6"/>
+          </a:effectRef>
+          <a:fontRef idx="minor">
+            <a:schemeClr val="dk1"/>
+          </a:fontRef>
+        </p:style>
+        <p:txBody>
+          <a:bodyPr rtlCol="0" anchor="ctr"/>
+          <a:lstStyle/>
+          <a:p>
+            <a:pPr algn="ctr"/>
+            <a:endParaRPr lang="en-SG" sz="1050"/>
+          </a:p>
+        </p:txBody>
+      </p:sp>
+    </p:spTree>
+    <p:extLst>
+      <p:ext uri="{BB962C8B-B14F-4D97-AF65-F5344CB8AC3E}">
+        <p14:creationId xmlns:p14="http://schemas.microsoft.com/office/powerpoint/2010/main" val="3237895324"/>
       </p:ext>
     </p:extLst>
   </p:cSld>

</xml_diff>